<commit_message>
Rapport_App_Eron : userstories , Wireframe : Worfklow (visitor_contact, visitor_faq) , Persona_Learner_2
</commit_message>
<xml_diff>
--- a/Persona/Persona_Yves_Maunier_Medecin_Junior.pptx
+++ b/Persona/Persona_Yves_Maunier_Medecin_Junior.pptx
@@ -6,6 +6,7 @@
   </p:sldMasterIdLst>
   <p:sldIdLst>
     <p:sldId id="256" r:id="rId3"/>
+    <p:sldId id="257" r:id="rId4"/>
   </p:sldIdLst>
   <p:sldSz cx="12192000" cy="6858000"/>
   <p:notesSz cx="7559675" cy="10691812"/>
@@ -53,7 +54,7 @@
       </p:grpSpPr>
       <p:sp>
         <p:nvSpPr>
-          <p:cNvPr id="26" name="PlaceHolder 1"/>
+          <p:cNvPr id="23" name="PlaceHolder 1"/>
           <p:cNvSpPr>
             <a:spLocks noGrp="1"/>
           </p:cNvSpPr>
@@ -64,7 +65,7 @@
         <p:spPr>
           <a:xfrm>
             <a:off x="1523880" y="1122480"/>
-            <a:ext cx="9143640" cy="2387160"/>
+            <a:ext cx="9143280" cy="2386800"/>
           </a:xfrm>
           <a:prstGeom prst="rect">
             <a:avLst/>
@@ -75,18 +76,16 @@
             <a:noAutofit/>
           </a:bodyPr>
           <a:p>
-            <a:endParaRPr b="0" lang="fr-FR" sz="1800" spc="-1" strike="noStrike">
-              <a:solidFill>
-                <a:srgbClr val="000000"/>
-              </a:solidFill>
-              <a:latin typeface="Calibri"/>
-            </a:endParaRPr>
-          </a:p>
-        </p:txBody>
-      </p:sp>
-      <p:sp>
-        <p:nvSpPr>
-          <p:cNvPr id="27" name="PlaceHolder 2"/>
+            <a:pPr algn="ctr"/>
+            <a:endParaRPr b="0" lang="fr-FR" sz="4400" spc="-1" strike="noStrike">
+              <a:latin typeface="Arial"/>
+            </a:endParaRPr>
+          </a:p>
+        </p:txBody>
+      </p:sp>
+      <p:sp>
+        <p:nvSpPr>
+          <p:cNvPr id="24" name="PlaceHolder 2"/>
           <p:cNvSpPr>
             <a:spLocks noGrp="1"/>
           </p:cNvSpPr>
@@ -108,18 +107,15 @@
             <a:normAutofit/>
           </a:bodyPr>
           <a:p>
-            <a:endParaRPr b="0" lang="fr-FR" sz="2800" spc="-1" strike="noStrike">
-              <a:solidFill>
-                <a:srgbClr val="000000"/>
-              </a:solidFill>
-              <a:latin typeface="Calibri"/>
-            </a:endParaRPr>
-          </a:p>
-        </p:txBody>
-      </p:sp>
-      <p:sp>
-        <p:nvSpPr>
-          <p:cNvPr id="28" name="PlaceHolder 3"/>
+            <a:endParaRPr b="0" lang="fr-FR" sz="3200" spc="-1" strike="noStrike">
+              <a:latin typeface="Arial"/>
+            </a:endParaRPr>
+          </a:p>
+        </p:txBody>
+      </p:sp>
+      <p:sp>
+        <p:nvSpPr>
+          <p:cNvPr id="25" name="PlaceHolder 3"/>
           <p:cNvSpPr>
             <a:spLocks noGrp="1"/>
           </p:cNvSpPr>
@@ -141,11 +137,8 @@
             <a:normAutofit/>
           </a:bodyPr>
           <a:p>
-            <a:endParaRPr b="0" lang="fr-FR" sz="2800" spc="-1" strike="noStrike">
-              <a:solidFill>
-                <a:srgbClr val="000000"/>
-              </a:solidFill>
-              <a:latin typeface="Calibri"/>
+            <a:endParaRPr b="0" lang="fr-FR" sz="3200" spc="-1" strike="noStrike">
+              <a:latin typeface="Arial"/>
             </a:endParaRPr>
           </a:p>
         </p:txBody>
@@ -174,7 +167,7 @@
       </p:grpSpPr>
       <p:sp>
         <p:nvSpPr>
-          <p:cNvPr id="29" name="PlaceHolder 1"/>
+          <p:cNvPr id="26" name="PlaceHolder 1"/>
           <p:cNvSpPr>
             <a:spLocks noGrp="1"/>
           </p:cNvSpPr>
@@ -185,7 +178,7 @@
         <p:spPr>
           <a:xfrm>
             <a:off x="1523880" y="1122480"/>
-            <a:ext cx="9143640" cy="2387160"/>
+            <a:ext cx="9143280" cy="2386800"/>
           </a:xfrm>
           <a:prstGeom prst="rect">
             <a:avLst/>
@@ -196,18 +189,16 @@
             <a:noAutofit/>
           </a:bodyPr>
           <a:p>
-            <a:endParaRPr b="0" lang="fr-FR" sz="1800" spc="-1" strike="noStrike">
-              <a:solidFill>
-                <a:srgbClr val="000000"/>
-              </a:solidFill>
-              <a:latin typeface="Calibri"/>
-            </a:endParaRPr>
-          </a:p>
-        </p:txBody>
-      </p:sp>
-      <p:sp>
-        <p:nvSpPr>
-          <p:cNvPr id="30" name="PlaceHolder 2"/>
+            <a:pPr algn="ctr"/>
+            <a:endParaRPr b="0" lang="fr-FR" sz="4400" spc="-1" strike="noStrike">
+              <a:latin typeface="Arial"/>
+            </a:endParaRPr>
+          </a:p>
+        </p:txBody>
+      </p:sp>
+      <p:sp>
+        <p:nvSpPr>
+          <p:cNvPr id="27" name="PlaceHolder 2"/>
           <p:cNvSpPr>
             <a:spLocks noGrp="1"/>
           </p:cNvSpPr>
@@ -229,18 +220,15 @@
             <a:normAutofit/>
           </a:bodyPr>
           <a:p>
-            <a:endParaRPr b="0" lang="fr-FR" sz="2800" spc="-1" strike="noStrike">
-              <a:solidFill>
-                <a:srgbClr val="000000"/>
-              </a:solidFill>
-              <a:latin typeface="Calibri"/>
-            </a:endParaRPr>
-          </a:p>
-        </p:txBody>
-      </p:sp>
-      <p:sp>
-        <p:nvSpPr>
-          <p:cNvPr id="31" name="PlaceHolder 3"/>
+            <a:endParaRPr b="0" lang="fr-FR" sz="3200" spc="-1" strike="noStrike">
+              <a:latin typeface="Arial"/>
+            </a:endParaRPr>
+          </a:p>
+        </p:txBody>
+      </p:sp>
+      <p:sp>
+        <p:nvSpPr>
+          <p:cNvPr id="28" name="PlaceHolder 3"/>
           <p:cNvSpPr>
             <a:spLocks noGrp="1"/>
           </p:cNvSpPr>
@@ -262,18 +250,15 @@
             <a:normAutofit/>
           </a:bodyPr>
           <a:p>
-            <a:endParaRPr b="0" lang="fr-FR" sz="2800" spc="-1" strike="noStrike">
-              <a:solidFill>
-                <a:srgbClr val="000000"/>
-              </a:solidFill>
-              <a:latin typeface="Calibri"/>
-            </a:endParaRPr>
-          </a:p>
-        </p:txBody>
-      </p:sp>
-      <p:sp>
-        <p:nvSpPr>
-          <p:cNvPr id="32" name="PlaceHolder 4"/>
+            <a:endParaRPr b="0" lang="fr-FR" sz="3200" spc="-1" strike="noStrike">
+              <a:latin typeface="Arial"/>
+            </a:endParaRPr>
+          </a:p>
+        </p:txBody>
+      </p:sp>
+      <p:sp>
+        <p:nvSpPr>
+          <p:cNvPr id="29" name="PlaceHolder 4"/>
           <p:cNvSpPr>
             <a:spLocks noGrp="1"/>
           </p:cNvSpPr>
@@ -295,18 +280,15 @@
             <a:normAutofit/>
           </a:bodyPr>
           <a:p>
-            <a:endParaRPr b="0" lang="fr-FR" sz="2800" spc="-1" strike="noStrike">
-              <a:solidFill>
-                <a:srgbClr val="000000"/>
-              </a:solidFill>
-              <a:latin typeface="Calibri"/>
-            </a:endParaRPr>
-          </a:p>
-        </p:txBody>
-      </p:sp>
-      <p:sp>
-        <p:nvSpPr>
-          <p:cNvPr id="33" name="PlaceHolder 5"/>
+            <a:endParaRPr b="0" lang="fr-FR" sz="3200" spc="-1" strike="noStrike">
+              <a:latin typeface="Arial"/>
+            </a:endParaRPr>
+          </a:p>
+        </p:txBody>
+      </p:sp>
+      <p:sp>
+        <p:nvSpPr>
+          <p:cNvPr id="30" name="PlaceHolder 5"/>
           <p:cNvSpPr>
             <a:spLocks noGrp="1"/>
           </p:cNvSpPr>
@@ -328,11 +310,8 @@
             <a:normAutofit/>
           </a:bodyPr>
           <a:p>
-            <a:endParaRPr b="0" lang="fr-FR" sz="2800" spc="-1" strike="noStrike">
-              <a:solidFill>
-                <a:srgbClr val="000000"/>
-              </a:solidFill>
-              <a:latin typeface="Calibri"/>
+            <a:endParaRPr b="0" lang="fr-FR" sz="3200" spc="-1" strike="noStrike">
+              <a:latin typeface="Arial"/>
             </a:endParaRPr>
           </a:p>
         </p:txBody>
@@ -361,7 +340,7 @@
       </p:grpSpPr>
       <p:sp>
         <p:nvSpPr>
-          <p:cNvPr id="34" name="PlaceHolder 1"/>
+          <p:cNvPr id="31" name="PlaceHolder 1"/>
           <p:cNvSpPr>
             <a:spLocks noGrp="1"/>
           </p:cNvSpPr>
@@ -372,7 +351,7 @@
         <p:spPr>
           <a:xfrm>
             <a:off x="1523880" y="1122480"/>
-            <a:ext cx="9143640" cy="2387160"/>
+            <a:ext cx="9143280" cy="2386800"/>
           </a:xfrm>
           <a:prstGeom prst="rect">
             <a:avLst/>
@@ -383,18 +362,16 @@
             <a:noAutofit/>
           </a:bodyPr>
           <a:p>
-            <a:endParaRPr b="0" lang="fr-FR" sz="1800" spc="-1" strike="noStrike">
-              <a:solidFill>
-                <a:srgbClr val="000000"/>
-              </a:solidFill>
-              <a:latin typeface="Calibri"/>
-            </a:endParaRPr>
-          </a:p>
-        </p:txBody>
-      </p:sp>
-      <p:sp>
-        <p:nvSpPr>
-          <p:cNvPr id="35" name="PlaceHolder 2"/>
+            <a:pPr algn="ctr"/>
+            <a:endParaRPr b="0" lang="fr-FR" sz="4400" spc="-1" strike="noStrike">
+              <a:latin typeface="Arial"/>
+            </a:endParaRPr>
+          </a:p>
+        </p:txBody>
+      </p:sp>
+      <p:sp>
+        <p:nvSpPr>
+          <p:cNvPr id="32" name="PlaceHolder 2"/>
           <p:cNvSpPr>
             <a:spLocks noGrp="1"/>
           </p:cNvSpPr>
@@ -416,18 +393,15 @@
             <a:normAutofit/>
           </a:bodyPr>
           <a:p>
-            <a:endParaRPr b="0" lang="fr-FR" sz="2800" spc="-1" strike="noStrike">
-              <a:solidFill>
-                <a:srgbClr val="000000"/>
-              </a:solidFill>
-              <a:latin typeface="Calibri"/>
-            </a:endParaRPr>
-          </a:p>
-        </p:txBody>
-      </p:sp>
-      <p:sp>
-        <p:nvSpPr>
-          <p:cNvPr id="36" name="PlaceHolder 3"/>
+            <a:endParaRPr b="0" lang="fr-FR" sz="3200" spc="-1" strike="noStrike">
+              <a:latin typeface="Arial"/>
+            </a:endParaRPr>
+          </a:p>
+        </p:txBody>
+      </p:sp>
+      <p:sp>
+        <p:nvSpPr>
+          <p:cNvPr id="33" name="PlaceHolder 3"/>
           <p:cNvSpPr>
             <a:spLocks noGrp="1"/>
           </p:cNvSpPr>
@@ -449,18 +423,15 @@
             <a:normAutofit/>
           </a:bodyPr>
           <a:p>
-            <a:endParaRPr b="0" lang="fr-FR" sz="2800" spc="-1" strike="noStrike">
-              <a:solidFill>
-                <a:srgbClr val="000000"/>
-              </a:solidFill>
-              <a:latin typeface="Calibri"/>
-            </a:endParaRPr>
-          </a:p>
-        </p:txBody>
-      </p:sp>
-      <p:sp>
-        <p:nvSpPr>
-          <p:cNvPr id="37" name="PlaceHolder 4"/>
+            <a:endParaRPr b="0" lang="fr-FR" sz="3200" spc="-1" strike="noStrike">
+              <a:latin typeface="Arial"/>
+            </a:endParaRPr>
+          </a:p>
+        </p:txBody>
+      </p:sp>
+      <p:sp>
+        <p:nvSpPr>
+          <p:cNvPr id="34" name="PlaceHolder 4"/>
           <p:cNvSpPr>
             <a:spLocks noGrp="1"/>
           </p:cNvSpPr>
@@ -482,18 +453,15 @@
             <a:normAutofit/>
           </a:bodyPr>
           <a:p>
-            <a:endParaRPr b="0" lang="fr-FR" sz="2800" spc="-1" strike="noStrike">
-              <a:solidFill>
-                <a:srgbClr val="000000"/>
-              </a:solidFill>
-              <a:latin typeface="Calibri"/>
-            </a:endParaRPr>
-          </a:p>
-        </p:txBody>
-      </p:sp>
-      <p:sp>
-        <p:nvSpPr>
-          <p:cNvPr id="38" name="PlaceHolder 5"/>
+            <a:endParaRPr b="0" lang="fr-FR" sz="3200" spc="-1" strike="noStrike">
+              <a:latin typeface="Arial"/>
+            </a:endParaRPr>
+          </a:p>
+        </p:txBody>
+      </p:sp>
+      <p:sp>
+        <p:nvSpPr>
+          <p:cNvPr id="35" name="PlaceHolder 5"/>
           <p:cNvSpPr>
             <a:spLocks noGrp="1"/>
           </p:cNvSpPr>
@@ -515,18 +483,15 @@
             <a:normAutofit/>
           </a:bodyPr>
           <a:p>
-            <a:endParaRPr b="0" lang="fr-FR" sz="2800" spc="-1" strike="noStrike">
-              <a:solidFill>
-                <a:srgbClr val="000000"/>
-              </a:solidFill>
-              <a:latin typeface="Calibri"/>
-            </a:endParaRPr>
-          </a:p>
-        </p:txBody>
-      </p:sp>
-      <p:sp>
-        <p:nvSpPr>
-          <p:cNvPr id="39" name="PlaceHolder 6"/>
+            <a:endParaRPr b="0" lang="fr-FR" sz="3200" spc="-1" strike="noStrike">
+              <a:latin typeface="Arial"/>
+            </a:endParaRPr>
+          </a:p>
+        </p:txBody>
+      </p:sp>
+      <p:sp>
+        <p:nvSpPr>
+          <p:cNvPr id="36" name="PlaceHolder 6"/>
           <p:cNvSpPr>
             <a:spLocks noGrp="1"/>
           </p:cNvSpPr>
@@ -548,18 +513,15 @@
             <a:normAutofit/>
           </a:bodyPr>
           <a:p>
-            <a:endParaRPr b="0" lang="fr-FR" sz="2800" spc="-1" strike="noStrike">
-              <a:solidFill>
-                <a:srgbClr val="000000"/>
-              </a:solidFill>
-              <a:latin typeface="Calibri"/>
-            </a:endParaRPr>
-          </a:p>
-        </p:txBody>
-      </p:sp>
-      <p:sp>
-        <p:nvSpPr>
-          <p:cNvPr id="40" name="PlaceHolder 7"/>
+            <a:endParaRPr b="0" lang="fr-FR" sz="3200" spc="-1" strike="noStrike">
+              <a:latin typeface="Arial"/>
+            </a:endParaRPr>
+          </a:p>
+        </p:txBody>
+      </p:sp>
+      <p:sp>
+        <p:nvSpPr>
+          <p:cNvPr id="37" name="PlaceHolder 7"/>
           <p:cNvSpPr>
             <a:spLocks noGrp="1"/>
           </p:cNvSpPr>
@@ -581,11 +543,8 @@
             <a:normAutofit/>
           </a:bodyPr>
           <a:p>
-            <a:endParaRPr b="0" lang="fr-FR" sz="2800" spc="-1" strike="noStrike">
-              <a:solidFill>
-                <a:srgbClr val="000000"/>
-              </a:solidFill>
-              <a:latin typeface="Calibri"/>
+            <a:endParaRPr b="0" lang="fr-FR" sz="3200" spc="-1" strike="noStrike">
+              <a:latin typeface="Arial"/>
             </a:endParaRPr>
           </a:p>
         </p:txBody>
@@ -614,7 +573,7 @@
       </p:grpSpPr>
       <p:sp>
         <p:nvSpPr>
-          <p:cNvPr id="5" name="PlaceHolder 1"/>
+          <p:cNvPr id="2" name="PlaceHolder 1"/>
           <p:cNvSpPr>
             <a:spLocks noGrp="1"/>
           </p:cNvSpPr>
@@ -625,7 +584,7 @@
         <p:spPr>
           <a:xfrm>
             <a:off x="1523880" y="1122480"/>
-            <a:ext cx="9143640" cy="2387160"/>
+            <a:ext cx="9143280" cy="2386800"/>
           </a:xfrm>
           <a:prstGeom prst="rect">
             <a:avLst/>
@@ -636,18 +595,16 @@
             <a:noAutofit/>
           </a:bodyPr>
           <a:p>
-            <a:endParaRPr b="0" lang="fr-FR" sz="1800" spc="-1" strike="noStrike">
-              <a:solidFill>
-                <a:srgbClr val="000000"/>
-              </a:solidFill>
-              <a:latin typeface="Calibri"/>
-            </a:endParaRPr>
-          </a:p>
-        </p:txBody>
-      </p:sp>
-      <p:sp>
-        <p:nvSpPr>
-          <p:cNvPr id="6" name="PlaceHolder 2"/>
+            <a:pPr algn="ctr"/>
+            <a:endParaRPr b="0" lang="fr-FR" sz="4400" spc="-1" strike="noStrike">
+              <a:latin typeface="Arial"/>
+            </a:endParaRPr>
+          </a:p>
+        </p:txBody>
+      </p:sp>
+      <p:sp>
+        <p:nvSpPr>
+          <p:cNvPr id="3" name="PlaceHolder 2"/>
           <p:cNvSpPr>
             <a:spLocks noGrp="1"/>
           </p:cNvSpPr>
@@ -700,7 +657,7 @@
       </p:grpSpPr>
       <p:sp>
         <p:nvSpPr>
-          <p:cNvPr id="7" name="PlaceHolder 1"/>
+          <p:cNvPr id="4" name="PlaceHolder 1"/>
           <p:cNvSpPr>
             <a:spLocks noGrp="1"/>
           </p:cNvSpPr>
@@ -711,7 +668,7 @@
         <p:spPr>
           <a:xfrm>
             <a:off x="1523880" y="1122480"/>
-            <a:ext cx="9143640" cy="2387160"/>
+            <a:ext cx="9143280" cy="2386800"/>
           </a:xfrm>
           <a:prstGeom prst="rect">
             <a:avLst/>
@@ -722,18 +679,16 @@
             <a:noAutofit/>
           </a:bodyPr>
           <a:p>
-            <a:endParaRPr b="0" lang="fr-FR" sz="1800" spc="-1" strike="noStrike">
-              <a:solidFill>
-                <a:srgbClr val="000000"/>
-              </a:solidFill>
-              <a:latin typeface="Calibri"/>
-            </a:endParaRPr>
-          </a:p>
-        </p:txBody>
-      </p:sp>
-      <p:sp>
-        <p:nvSpPr>
-          <p:cNvPr id="8" name="PlaceHolder 2"/>
+            <a:pPr algn="ctr"/>
+            <a:endParaRPr b="0" lang="fr-FR" sz="4400" spc="-1" strike="noStrike">
+              <a:latin typeface="Arial"/>
+            </a:endParaRPr>
+          </a:p>
+        </p:txBody>
+      </p:sp>
+      <p:sp>
+        <p:nvSpPr>
+          <p:cNvPr id="5" name="PlaceHolder 2"/>
           <p:cNvSpPr>
             <a:spLocks noGrp="1"/>
           </p:cNvSpPr>
@@ -755,11 +710,8 @@
             <a:normAutofit/>
           </a:bodyPr>
           <a:p>
-            <a:endParaRPr b="0" lang="fr-FR" sz="2800" spc="-1" strike="noStrike">
-              <a:solidFill>
-                <a:srgbClr val="000000"/>
-              </a:solidFill>
-              <a:latin typeface="Calibri"/>
+            <a:endParaRPr b="0" lang="fr-FR" sz="3200" spc="-1" strike="noStrike">
+              <a:latin typeface="Arial"/>
             </a:endParaRPr>
           </a:p>
         </p:txBody>
@@ -788,7 +740,7 @@
       </p:grpSpPr>
       <p:sp>
         <p:nvSpPr>
-          <p:cNvPr id="9" name="PlaceHolder 1"/>
+          <p:cNvPr id="6" name="PlaceHolder 1"/>
           <p:cNvSpPr>
             <a:spLocks noGrp="1"/>
           </p:cNvSpPr>
@@ -799,7 +751,7 @@
         <p:spPr>
           <a:xfrm>
             <a:off x="1523880" y="1122480"/>
-            <a:ext cx="9143640" cy="2387160"/>
+            <a:ext cx="9143280" cy="2386800"/>
           </a:xfrm>
           <a:prstGeom prst="rect">
             <a:avLst/>
@@ -810,18 +762,16 @@
             <a:noAutofit/>
           </a:bodyPr>
           <a:p>
-            <a:endParaRPr b="0" lang="fr-FR" sz="1800" spc="-1" strike="noStrike">
-              <a:solidFill>
-                <a:srgbClr val="000000"/>
-              </a:solidFill>
-              <a:latin typeface="Calibri"/>
-            </a:endParaRPr>
-          </a:p>
-        </p:txBody>
-      </p:sp>
-      <p:sp>
-        <p:nvSpPr>
-          <p:cNvPr id="10" name="PlaceHolder 2"/>
+            <a:pPr algn="ctr"/>
+            <a:endParaRPr b="0" lang="fr-FR" sz="4400" spc="-1" strike="noStrike">
+              <a:latin typeface="Arial"/>
+            </a:endParaRPr>
+          </a:p>
+        </p:txBody>
+      </p:sp>
+      <p:sp>
+        <p:nvSpPr>
+          <p:cNvPr id="7" name="PlaceHolder 2"/>
           <p:cNvSpPr>
             <a:spLocks noGrp="1"/>
           </p:cNvSpPr>
@@ -843,18 +793,15 @@
             <a:normAutofit/>
           </a:bodyPr>
           <a:p>
-            <a:endParaRPr b="0" lang="fr-FR" sz="2800" spc="-1" strike="noStrike">
-              <a:solidFill>
-                <a:srgbClr val="000000"/>
-              </a:solidFill>
-              <a:latin typeface="Calibri"/>
-            </a:endParaRPr>
-          </a:p>
-        </p:txBody>
-      </p:sp>
-      <p:sp>
-        <p:nvSpPr>
-          <p:cNvPr id="11" name="PlaceHolder 3"/>
+            <a:endParaRPr b="0" lang="fr-FR" sz="3200" spc="-1" strike="noStrike">
+              <a:latin typeface="Arial"/>
+            </a:endParaRPr>
+          </a:p>
+        </p:txBody>
+      </p:sp>
+      <p:sp>
+        <p:nvSpPr>
+          <p:cNvPr id="8" name="PlaceHolder 3"/>
           <p:cNvSpPr>
             <a:spLocks noGrp="1"/>
           </p:cNvSpPr>
@@ -876,11 +823,8 @@
             <a:normAutofit/>
           </a:bodyPr>
           <a:p>
-            <a:endParaRPr b="0" lang="fr-FR" sz="2800" spc="-1" strike="noStrike">
-              <a:solidFill>
-                <a:srgbClr val="000000"/>
-              </a:solidFill>
-              <a:latin typeface="Calibri"/>
+            <a:endParaRPr b="0" lang="fr-FR" sz="3200" spc="-1" strike="noStrike">
+              <a:latin typeface="Arial"/>
             </a:endParaRPr>
           </a:p>
         </p:txBody>
@@ -909,7 +853,7 @@
       </p:grpSpPr>
       <p:sp>
         <p:nvSpPr>
-          <p:cNvPr id="12" name="PlaceHolder 1"/>
+          <p:cNvPr id="9" name="PlaceHolder 1"/>
           <p:cNvSpPr>
             <a:spLocks noGrp="1"/>
           </p:cNvSpPr>
@@ -920,7 +864,7 @@
         <p:spPr>
           <a:xfrm>
             <a:off x="1523880" y="1122480"/>
-            <a:ext cx="9143640" cy="2387160"/>
+            <a:ext cx="9143280" cy="2386800"/>
           </a:xfrm>
           <a:prstGeom prst="rect">
             <a:avLst/>
@@ -931,11 +875,9 @@
             <a:noAutofit/>
           </a:bodyPr>
           <a:p>
-            <a:endParaRPr b="0" lang="fr-FR" sz="1800" spc="-1" strike="noStrike">
-              <a:solidFill>
-                <a:srgbClr val="000000"/>
-              </a:solidFill>
-              <a:latin typeface="Calibri"/>
+            <a:pPr algn="ctr"/>
+            <a:endParaRPr b="0" lang="fr-FR" sz="4400" spc="-1" strike="noStrike">
+              <a:latin typeface="Arial"/>
             </a:endParaRPr>
           </a:p>
         </p:txBody>
@@ -964,7 +906,7 @@
       </p:grpSpPr>
       <p:sp>
         <p:nvSpPr>
-          <p:cNvPr id="13" name="PlaceHolder 1"/>
+          <p:cNvPr id="10" name="PlaceHolder 1"/>
           <p:cNvSpPr>
             <a:spLocks noGrp="1"/>
           </p:cNvSpPr>
@@ -975,7 +917,7 @@
         <p:spPr>
           <a:xfrm>
             <a:off x="1523880" y="1122480"/>
-            <a:ext cx="9143640" cy="11066760"/>
+            <a:ext cx="9143280" cy="11064960"/>
           </a:xfrm>
           <a:prstGeom prst="rect">
             <a:avLst/>
@@ -1017,7 +959,7 @@
       </p:grpSpPr>
       <p:sp>
         <p:nvSpPr>
-          <p:cNvPr id="14" name="PlaceHolder 1"/>
+          <p:cNvPr id="11" name="PlaceHolder 1"/>
           <p:cNvSpPr>
             <a:spLocks noGrp="1"/>
           </p:cNvSpPr>
@@ -1028,7 +970,7 @@
         <p:spPr>
           <a:xfrm>
             <a:off x="1523880" y="1122480"/>
-            <a:ext cx="9143640" cy="2387160"/>
+            <a:ext cx="9143280" cy="2386800"/>
           </a:xfrm>
           <a:prstGeom prst="rect">
             <a:avLst/>
@@ -1039,18 +981,16 @@
             <a:noAutofit/>
           </a:bodyPr>
           <a:p>
-            <a:endParaRPr b="0" lang="fr-FR" sz="1800" spc="-1" strike="noStrike">
-              <a:solidFill>
-                <a:srgbClr val="000000"/>
-              </a:solidFill>
-              <a:latin typeface="Calibri"/>
-            </a:endParaRPr>
-          </a:p>
-        </p:txBody>
-      </p:sp>
-      <p:sp>
-        <p:nvSpPr>
-          <p:cNvPr id="15" name="PlaceHolder 2"/>
+            <a:pPr algn="ctr"/>
+            <a:endParaRPr b="0" lang="fr-FR" sz="4400" spc="-1" strike="noStrike">
+              <a:latin typeface="Arial"/>
+            </a:endParaRPr>
+          </a:p>
+        </p:txBody>
+      </p:sp>
+      <p:sp>
+        <p:nvSpPr>
+          <p:cNvPr id="12" name="PlaceHolder 2"/>
           <p:cNvSpPr>
             <a:spLocks noGrp="1"/>
           </p:cNvSpPr>
@@ -1072,18 +1012,15 @@
             <a:normAutofit/>
           </a:bodyPr>
           <a:p>
-            <a:endParaRPr b="0" lang="fr-FR" sz="2800" spc="-1" strike="noStrike">
-              <a:solidFill>
-                <a:srgbClr val="000000"/>
-              </a:solidFill>
-              <a:latin typeface="Calibri"/>
-            </a:endParaRPr>
-          </a:p>
-        </p:txBody>
-      </p:sp>
-      <p:sp>
-        <p:nvSpPr>
-          <p:cNvPr id="16" name="PlaceHolder 3"/>
+            <a:endParaRPr b="0" lang="fr-FR" sz="3200" spc="-1" strike="noStrike">
+              <a:latin typeface="Arial"/>
+            </a:endParaRPr>
+          </a:p>
+        </p:txBody>
+      </p:sp>
+      <p:sp>
+        <p:nvSpPr>
+          <p:cNvPr id="13" name="PlaceHolder 3"/>
           <p:cNvSpPr>
             <a:spLocks noGrp="1"/>
           </p:cNvSpPr>
@@ -1105,18 +1042,15 @@
             <a:normAutofit/>
           </a:bodyPr>
           <a:p>
-            <a:endParaRPr b="0" lang="fr-FR" sz="2800" spc="-1" strike="noStrike">
-              <a:solidFill>
-                <a:srgbClr val="000000"/>
-              </a:solidFill>
-              <a:latin typeface="Calibri"/>
-            </a:endParaRPr>
-          </a:p>
-        </p:txBody>
-      </p:sp>
-      <p:sp>
-        <p:nvSpPr>
-          <p:cNvPr id="17" name="PlaceHolder 4"/>
+            <a:endParaRPr b="0" lang="fr-FR" sz="3200" spc="-1" strike="noStrike">
+              <a:latin typeface="Arial"/>
+            </a:endParaRPr>
+          </a:p>
+        </p:txBody>
+      </p:sp>
+      <p:sp>
+        <p:nvSpPr>
+          <p:cNvPr id="14" name="PlaceHolder 4"/>
           <p:cNvSpPr>
             <a:spLocks noGrp="1"/>
           </p:cNvSpPr>
@@ -1138,11 +1072,8 @@
             <a:normAutofit/>
           </a:bodyPr>
           <a:p>
-            <a:endParaRPr b="0" lang="fr-FR" sz="2800" spc="-1" strike="noStrike">
-              <a:solidFill>
-                <a:srgbClr val="000000"/>
-              </a:solidFill>
-              <a:latin typeface="Calibri"/>
+            <a:endParaRPr b="0" lang="fr-FR" sz="3200" spc="-1" strike="noStrike">
+              <a:latin typeface="Arial"/>
             </a:endParaRPr>
           </a:p>
         </p:txBody>
@@ -1171,7 +1102,7 @@
       </p:grpSpPr>
       <p:sp>
         <p:nvSpPr>
-          <p:cNvPr id="18" name="PlaceHolder 1"/>
+          <p:cNvPr id="15" name="PlaceHolder 1"/>
           <p:cNvSpPr>
             <a:spLocks noGrp="1"/>
           </p:cNvSpPr>
@@ -1182,7 +1113,7 @@
         <p:spPr>
           <a:xfrm>
             <a:off x="1523880" y="1122480"/>
-            <a:ext cx="9143640" cy="2387160"/>
+            <a:ext cx="9143280" cy="2386800"/>
           </a:xfrm>
           <a:prstGeom prst="rect">
             <a:avLst/>
@@ -1193,18 +1124,16 @@
             <a:noAutofit/>
           </a:bodyPr>
           <a:p>
-            <a:endParaRPr b="0" lang="fr-FR" sz="1800" spc="-1" strike="noStrike">
-              <a:solidFill>
-                <a:srgbClr val="000000"/>
-              </a:solidFill>
-              <a:latin typeface="Calibri"/>
-            </a:endParaRPr>
-          </a:p>
-        </p:txBody>
-      </p:sp>
-      <p:sp>
-        <p:nvSpPr>
-          <p:cNvPr id="19" name="PlaceHolder 2"/>
+            <a:pPr algn="ctr"/>
+            <a:endParaRPr b="0" lang="fr-FR" sz="4400" spc="-1" strike="noStrike">
+              <a:latin typeface="Arial"/>
+            </a:endParaRPr>
+          </a:p>
+        </p:txBody>
+      </p:sp>
+      <p:sp>
+        <p:nvSpPr>
+          <p:cNvPr id="16" name="PlaceHolder 2"/>
           <p:cNvSpPr>
             <a:spLocks noGrp="1"/>
           </p:cNvSpPr>
@@ -1226,18 +1155,15 @@
             <a:normAutofit/>
           </a:bodyPr>
           <a:p>
-            <a:endParaRPr b="0" lang="fr-FR" sz="2800" spc="-1" strike="noStrike">
-              <a:solidFill>
-                <a:srgbClr val="000000"/>
-              </a:solidFill>
-              <a:latin typeface="Calibri"/>
-            </a:endParaRPr>
-          </a:p>
-        </p:txBody>
-      </p:sp>
-      <p:sp>
-        <p:nvSpPr>
-          <p:cNvPr id="20" name="PlaceHolder 3"/>
+            <a:endParaRPr b="0" lang="fr-FR" sz="3200" spc="-1" strike="noStrike">
+              <a:latin typeface="Arial"/>
+            </a:endParaRPr>
+          </a:p>
+        </p:txBody>
+      </p:sp>
+      <p:sp>
+        <p:nvSpPr>
+          <p:cNvPr id="17" name="PlaceHolder 3"/>
           <p:cNvSpPr>
             <a:spLocks noGrp="1"/>
           </p:cNvSpPr>
@@ -1259,18 +1185,15 @@
             <a:normAutofit/>
           </a:bodyPr>
           <a:p>
-            <a:endParaRPr b="0" lang="fr-FR" sz="2800" spc="-1" strike="noStrike">
-              <a:solidFill>
-                <a:srgbClr val="000000"/>
-              </a:solidFill>
-              <a:latin typeface="Calibri"/>
-            </a:endParaRPr>
-          </a:p>
-        </p:txBody>
-      </p:sp>
-      <p:sp>
-        <p:nvSpPr>
-          <p:cNvPr id="21" name="PlaceHolder 4"/>
+            <a:endParaRPr b="0" lang="fr-FR" sz="3200" spc="-1" strike="noStrike">
+              <a:latin typeface="Arial"/>
+            </a:endParaRPr>
+          </a:p>
+        </p:txBody>
+      </p:sp>
+      <p:sp>
+        <p:nvSpPr>
+          <p:cNvPr id="18" name="PlaceHolder 4"/>
           <p:cNvSpPr>
             <a:spLocks noGrp="1"/>
           </p:cNvSpPr>
@@ -1292,11 +1215,8 @@
             <a:normAutofit/>
           </a:bodyPr>
           <a:p>
-            <a:endParaRPr b="0" lang="fr-FR" sz="2800" spc="-1" strike="noStrike">
-              <a:solidFill>
-                <a:srgbClr val="000000"/>
-              </a:solidFill>
-              <a:latin typeface="Calibri"/>
+            <a:endParaRPr b="0" lang="fr-FR" sz="3200" spc="-1" strike="noStrike">
+              <a:latin typeface="Arial"/>
             </a:endParaRPr>
           </a:p>
         </p:txBody>
@@ -1325,7 +1245,7 @@
       </p:grpSpPr>
       <p:sp>
         <p:nvSpPr>
-          <p:cNvPr id="22" name="PlaceHolder 1"/>
+          <p:cNvPr id="19" name="PlaceHolder 1"/>
           <p:cNvSpPr>
             <a:spLocks noGrp="1"/>
           </p:cNvSpPr>
@@ -1336,7 +1256,7 @@
         <p:spPr>
           <a:xfrm>
             <a:off x="1523880" y="1122480"/>
-            <a:ext cx="9143640" cy="2387160"/>
+            <a:ext cx="9143280" cy="2386800"/>
           </a:xfrm>
           <a:prstGeom prst="rect">
             <a:avLst/>
@@ -1347,18 +1267,16 @@
             <a:noAutofit/>
           </a:bodyPr>
           <a:p>
-            <a:endParaRPr b="0" lang="fr-FR" sz="1800" spc="-1" strike="noStrike">
-              <a:solidFill>
-                <a:srgbClr val="000000"/>
-              </a:solidFill>
-              <a:latin typeface="Calibri"/>
-            </a:endParaRPr>
-          </a:p>
-        </p:txBody>
-      </p:sp>
-      <p:sp>
-        <p:nvSpPr>
-          <p:cNvPr id="23" name="PlaceHolder 2"/>
+            <a:pPr algn="ctr"/>
+            <a:endParaRPr b="0" lang="fr-FR" sz="4400" spc="-1" strike="noStrike">
+              <a:latin typeface="Arial"/>
+            </a:endParaRPr>
+          </a:p>
+        </p:txBody>
+      </p:sp>
+      <p:sp>
+        <p:nvSpPr>
+          <p:cNvPr id="20" name="PlaceHolder 2"/>
           <p:cNvSpPr>
             <a:spLocks noGrp="1"/>
           </p:cNvSpPr>
@@ -1380,18 +1298,15 @@
             <a:normAutofit/>
           </a:bodyPr>
           <a:p>
-            <a:endParaRPr b="0" lang="fr-FR" sz="2800" spc="-1" strike="noStrike">
-              <a:solidFill>
-                <a:srgbClr val="000000"/>
-              </a:solidFill>
-              <a:latin typeface="Calibri"/>
-            </a:endParaRPr>
-          </a:p>
-        </p:txBody>
-      </p:sp>
-      <p:sp>
-        <p:nvSpPr>
-          <p:cNvPr id="24" name="PlaceHolder 3"/>
+            <a:endParaRPr b="0" lang="fr-FR" sz="3200" spc="-1" strike="noStrike">
+              <a:latin typeface="Arial"/>
+            </a:endParaRPr>
+          </a:p>
+        </p:txBody>
+      </p:sp>
+      <p:sp>
+        <p:nvSpPr>
+          <p:cNvPr id="21" name="PlaceHolder 3"/>
           <p:cNvSpPr>
             <a:spLocks noGrp="1"/>
           </p:cNvSpPr>
@@ -1413,18 +1328,15 @@
             <a:normAutofit/>
           </a:bodyPr>
           <a:p>
-            <a:endParaRPr b="0" lang="fr-FR" sz="2800" spc="-1" strike="noStrike">
-              <a:solidFill>
-                <a:srgbClr val="000000"/>
-              </a:solidFill>
-              <a:latin typeface="Calibri"/>
-            </a:endParaRPr>
-          </a:p>
-        </p:txBody>
-      </p:sp>
-      <p:sp>
-        <p:nvSpPr>
-          <p:cNvPr id="25" name="PlaceHolder 4"/>
+            <a:endParaRPr b="0" lang="fr-FR" sz="3200" spc="-1" strike="noStrike">
+              <a:latin typeface="Arial"/>
+            </a:endParaRPr>
+          </a:p>
+        </p:txBody>
+      </p:sp>
+      <p:sp>
+        <p:nvSpPr>
+          <p:cNvPr id="22" name="PlaceHolder 4"/>
           <p:cNvSpPr>
             <a:spLocks noGrp="1"/>
           </p:cNvSpPr>
@@ -1446,11 +1358,8 @@
             <a:normAutofit/>
           </a:bodyPr>
           <a:p>
-            <a:endParaRPr b="0" lang="fr-FR" sz="2800" spc="-1" strike="noStrike">
-              <a:solidFill>
-                <a:srgbClr val="000000"/>
-              </a:solidFill>
-              <a:latin typeface="Calibri"/>
+            <a:endParaRPr b="0" lang="fr-FR" sz="3200" spc="-1" strike="noStrike">
+              <a:latin typeface="Arial"/>
             </a:endParaRPr>
           </a:p>
         </p:txBody>
@@ -1497,36 +1406,25 @@
         <p:spPr>
           <a:xfrm>
             <a:off x="1523880" y="1122480"/>
-            <a:ext cx="9143640" cy="2387160"/>
-          </a:xfrm>
-          <a:prstGeom prst="rect">
-            <a:avLst/>
-          </a:prstGeom>
-        </p:spPr>
-        <p:txBody>
-          <a:bodyPr anchor="b">
+            <a:ext cx="9143280" cy="2386800"/>
+          </a:xfrm>
+          <a:prstGeom prst="rect">
+            <a:avLst/>
+          </a:prstGeom>
+        </p:spPr>
+        <p:txBody>
+          <a:bodyPr lIns="0" rIns="0" tIns="0" bIns="0" anchor="ctr">
             <a:noAutofit/>
           </a:bodyPr>
           <a:p>
-            <a:pPr algn="ctr">
-              <a:lnSpc>
-                <a:spcPct val="90000"/>
-              </a:lnSpc>
-            </a:pPr>
             <a:r>
-              <a:rPr b="0" lang="fr-FR" sz="6000" spc="-1" strike="noStrike">
-                <a:solidFill>
-                  <a:srgbClr val="000000"/>
-                </a:solidFill>
-                <a:latin typeface="Calibri Light"/>
+              <a:rPr b="0" lang="fr-FR" sz="1800" spc="-1" strike="noStrike">
+                <a:latin typeface="Arial"/>
               </a:rPr>
-              <a:t>Modifiez le style du titre</a:t>
+              <a:t>Cliquez pour éditer le format du texte-titre</a:t>
             </a:r>
-            <a:endParaRPr b="0" lang="fr-FR" sz="6000" spc="-1" strike="noStrike">
-              <a:solidFill>
-                <a:srgbClr val="000000"/>
-              </a:solidFill>
-              <a:latin typeface="Calibri"/>
+            <a:endParaRPr b="0" lang="fr-FR" sz="1800" spc="-1" strike="noStrike">
+              <a:latin typeface="Arial"/>
             </a:endParaRPr>
           </a:p>
         </p:txBody>
@@ -1534,124 +1432,6 @@
       <p:sp>
         <p:nvSpPr>
           <p:cNvPr id="1" name="PlaceHolder 2"/>
-          <p:cNvSpPr>
-            <a:spLocks noGrp="1"/>
-          </p:cNvSpPr>
-          <p:nvPr>
-            <p:ph type="dt"/>
-          </p:nvPr>
-        </p:nvSpPr>
-        <p:spPr>
-          <a:xfrm>
-            <a:off x="838080" y="6356520"/>
-            <a:ext cx="2742840" cy="364680"/>
-          </a:xfrm>
-          <a:prstGeom prst="rect">
-            <a:avLst/>
-          </a:prstGeom>
-        </p:spPr>
-        <p:txBody>
-          <a:bodyPr anchor="ctr">
-            <a:noAutofit/>
-          </a:bodyPr>
-          <a:p>
-            <a:pPr>
-              <a:lnSpc>
-                <a:spcPct val="100000"/>
-              </a:lnSpc>
-            </a:pPr>
-            <a:fld id="{6BCAC944-6030-46F1-A97D-C73E16051A76}" type="datetime">
-              <a:rPr b="0" lang="fr-FR" sz="1200" spc="-1" strike="noStrike">
-                <a:solidFill>
-                  <a:srgbClr val="8b8b8b"/>
-                </a:solidFill>
-                <a:latin typeface="Calibri"/>
-              </a:rPr>
-              <a:t>26/05/2021</a:t>
-            </a:fld>
-            <a:endParaRPr b="0" lang="fr-FR" sz="1200" spc="-1" strike="noStrike">
-              <a:latin typeface="Times New Roman"/>
-            </a:endParaRPr>
-          </a:p>
-        </p:txBody>
-      </p:sp>
-      <p:sp>
-        <p:nvSpPr>
-          <p:cNvPr id="2" name="PlaceHolder 3"/>
-          <p:cNvSpPr>
-            <a:spLocks noGrp="1"/>
-          </p:cNvSpPr>
-          <p:nvPr>
-            <p:ph type="ftr"/>
-          </p:nvPr>
-        </p:nvSpPr>
-        <p:spPr>
-          <a:xfrm>
-            <a:off x="4038480" y="6356520"/>
-            <a:ext cx="4114440" cy="364680"/>
-          </a:xfrm>
-          <a:prstGeom prst="rect">
-            <a:avLst/>
-          </a:prstGeom>
-        </p:spPr>
-        <p:txBody>
-          <a:bodyPr anchor="ctr">
-            <a:noAutofit/>
-          </a:bodyPr>
-          <a:p>
-            <a:endParaRPr b="0" lang="fr-FR" sz="2400" spc="-1" strike="noStrike">
-              <a:latin typeface="Times New Roman"/>
-            </a:endParaRPr>
-          </a:p>
-        </p:txBody>
-      </p:sp>
-      <p:sp>
-        <p:nvSpPr>
-          <p:cNvPr id="3" name="PlaceHolder 4"/>
-          <p:cNvSpPr>
-            <a:spLocks noGrp="1"/>
-          </p:cNvSpPr>
-          <p:nvPr>
-            <p:ph type="sldNum"/>
-          </p:nvPr>
-        </p:nvSpPr>
-        <p:spPr>
-          <a:xfrm>
-            <a:off x="8610480" y="6356520"/>
-            <a:ext cx="2742840" cy="364680"/>
-          </a:xfrm>
-          <a:prstGeom prst="rect">
-            <a:avLst/>
-          </a:prstGeom>
-        </p:spPr>
-        <p:txBody>
-          <a:bodyPr anchor="ctr">
-            <a:noAutofit/>
-          </a:bodyPr>
-          <a:p>
-            <a:pPr algn="r">
-              <a:lnSpc>
-                <a:spcPct val="100000"/>
-              </a:lnSpc>
-            </a:pPr>
-            <a:fld id="{92EB9274-7F63-412B-A165-94BF69F23191}" type="slidenum">
-              <a:rPr b="0" lang="fr-FR" sz="1200" spc="-1" strike="noStrike">
-                <a:solidFill>
-                  <a:srgbClr val="8b8b8b"/>
-                </a:solidFill>
-                <a:latin typeface="Calibri"/>
-              </a:rPr>
-              <a:t>&lt;numéro&gt;</a:t>
-            </a:fld>
-            <a:endParaRPr b="0" lang="fr-FR" sz="1200" spc="-1" strike="noStrike">
-              <a:latin typeface="Times New Roman"/>
-            </a:endParaRPr>
-          </a:p>
-        </p:txBody>
-      </p:sp>
-      <p:sp>
-        <p:nvSpPr>
-          <p:cNvPr id="4" name="PlaceHolder 5"/>
           <p:cNvSpPr>
             <a:spLocks noGrp="1"/>
           </p:cNvSpPr>
@@ -1685,19 +1465,13 @@
               <a:buChar char=""/>
             </a:pPr>
             <a:r>
-              <a:rPr b="0" lang="fr-FR" sz="2800" spc="-1" strike="noStrike">
-                <a:solidFill>
-                  <a:srgbClr val="000000"/>
-                </a:solidFill>
-                <a:latin typeface="Calibri"/>
+              <a:rPr b="0" lang="fr-FR" sz="3200" spc="-1" strike="noStrike">
+                <a:latin typeface="Arial"/>
               </a:rPr>
               <a:t>Cliquez pour éditer le format du plan de texte</a:t>
             </a:r>
-            <a:endParaRPr b="0" lang="fr-FR" sz="2800" spc="-1" strike="noStrike">
-              <a:solidFill>
-                <a:srgbClr val="000000"/>
-              </a:solidFill>
-              <a:latin typeface="Calibri"/>
+            <a:endParaRPr b="0" lang="fr-FR" sz="3200" spc="-1" strike="noStrike">
+              <a:latin typeface="Arial"/>
             </a:endParaRPr>
           </a:p>
           <a:p>
@@ -1713,19 +1487,13 @@
               <a:buChar char=""/>
             </a:pPr>
             <a:r>
-              <a:rPr b="0" lang="fr-FR" sz="2000" spc="-1" strike="noStrike">
-                <a:solidFill>
-                  <a:srgbClr val="000000"/>
-                </a:solidFill>
-                <a:latin typeface="Calibri"/>
+              <a:rPr b="0" lang="fr-FR" sz="2800" spc="-1" strike="noStrike">
+                <a:latin typeface="Arial"/>
               </a:rPr>
               <a:t>Second niveau de plan</a:t>
             </a:r>
-            <a:endParaRPr b="0" lang="fr-FR" sz="2000" spc="-1" strike="noStrike">
-              <a:solidFill>
-                <a:srgbClr val="000000"/>
-              </a:solidFill>
-              <a:latin typeface="Calibri"/>
+            <a:endParaRPr b="0" lang="fr-FR" sz="2800" spc="-1" strike="noStrike">
+              <a:latin typeface="Arial"/>
             </a:endParaRPr>
           </a:p>
           <a:p>
@@ -1741,19 +1509,13 @@
               <a:buChar char=""/>
             </a:pPr>
             <a:r>
-              <a:rPr b="0" lang="fr-FR" sz="1800" spc="-1" strike="noStrike">
-                <a:solidFill>
-                  <a:srgbClr val="000000"/>
-                </a:solidFill>
-                <a:latin typeface="Calibri"/>
+              <a:rPr b="0" lang="fr-FR" sz="2400" spc="-1" strike="noStrike">
+                <a:latin typeface="Arial"/>
               </a:rPr>
               <a:t>Troisième niveau de plan</a:t>
             </a:r>
-            <a:endParaRPr b="0" lang="fr-FR" sz="1800" spc="-1" strike="noStrike">
-              <a:solidFill>
-                <a:srgbClr val="000000"/>
-              </a:solidFill>
-              <a:latin typeface="Calibri"/>
+            <a:endParaRPr b="0" lang="fr-FR" sz="2400" spc="-1" strike="noStrike">
+              <a:latin typeface="Arial"/>
             </a:endParaRPr>
           </a:p>
           <a:p>
@@ -1769,19 +1531,13 @@
               <a:buChar char=""/>
             </a:pPr>
             <a:r>
-              <a:rPr b="0" lang="fr-FR" sz="1800" spc="-1" strike="noStrike">
-                <a:solidFill>
-                  <a:srgbClr val="000000"/>
-                </a:solidFill>
-                <a:latin typeface="Calibri"/>
+              <a:rPr b="0" lang="fr-FR" sz="2000" spc="-1" strike="noStrike">
+                <a:latin typeface="Arial"/>
               </a:rPr>
               <a:t>Quatrième niveau de plan</a:t>
             </a:r>
-            <a:endParaRPr b="0" lang="fr-FR" sz="1800" spc="-1" strike="noStrike">
-              <a:solidFill>
-                <a:srgbClr val="000000"/>
-              </a:solidFill>
-              <a:latin typeface="Calibri"/>
+            <a:endParaRPr b="0" lang="fr-FR" sz="2000" spc="-1" strike="noStrike">
+              <a:latin typeface="Arial"/>
             </a:endParaRPr>
           </a:p>
           <a:p>
@@ -1798,18 +1554,12 @@
             </a:pPr>
             <a:r>
               <a:rPr b="0" lang="fr-FR" sz="2000" spc="-1" strike="noStrike">
-                <a:solidFill>
-                  <a:srgbClr val="000000"/>
-                </a:solidFill>
-                <a:latin typeface="Calibri"/>
+                <a:latin typeface="Arial"/>
               </a:rPr>
               <a:t>Cinquième niveau de plan</a:t>
             </a:r>
             <a:endParaRPr b="0" lang="fr-FR" sz="2000" spc="-1" strike="noStrike">
-              <a:solidFill>
-                <a:srgbClr val="000000"/>
-              </a:solidFill>
-              <a:latin typeface="Calibri"/>
+              <a:latin typeface="Arial"/>
             </a:endParaRPr>
           </a:p>
           <a:p>
@@ -1826,18 +1576,12 @@
             </a:pPr>
             <a:r>
               <a:rPr b="0" lang="fr-FR" sz="2000" spc="-1" strike="noStrike">
-                <a:solidFill>
-                  <a:srgbClr val="000000"/>
-                </a:solidFill>
-                <a:latin typeface="Calibri"/>
+                <a:latin typeface="Arial"/>
               </a:rPr>
               <a:t>Sixième niveau de plan</a:t>
             </a:r>
             <a:endParaRPr b="0" lang="fr-FR" sz="2000" spc="-1" strike="noStrike">
-              <a:solidFill>
-                <a:srgbClr val="000000"/>
-              </a:solidFill>
-              <a:latin typeface="Calibri"/>
+              <a:latin typeface="Arial"/>
             </a:endParaRPr>
           </a:p>
           <a:p>
@@ -1854,18 +1598,12 @@
             </a:pPr>
             <a:r>
               <a:rPr b="0" lang="fr-FR" sz="2000" spc="-1" strike="noStrike">
-                <a:solidFill>
-                  <a:srgbClr val="000000"/>
-                </a:solidFill>
-                <a:latin typeface="Calibri"/>
+                <a:latin typeface="Arial"/>
               </a:rPr>
               <a:t>Septième niveau de plan</a:t>
             </a:r>
             <a:endParaRPr b="0" lang="fr-FR" sz="2000" spc="-1" strike="noStrike">
-              <a:solidFill>
-                <a:srgbClr val="000000"/>
-              </a:solidFill>
-              <a:latin typeface="Calibri"/>
+              <a:latin typeface="Arial"/>
             </a:endParaRPr>
           </a:p>
         </p:txBody>
@@ -1909,14 +1647,14 @@
       </p:grpSpPr>
       <p:sp>
         <p:nvSpPr>
-          <p:cNvPr id="41" name="CustomShape 1"/>
+          <p:cNvPr id="38" name="CustomShape 1"/>
           <p:cNvSpPr/>
           <p:nvPr/>
         </p:nvSpPr>
         <p:spPr>
           <a:xfrm>
-            <a:off x="1463760" y="312480"/>
-            <a:ext cx="9195480" cy="329400"/>
+            <a:off x="864000" y="312480"/>
+            <a:ext cx="9794880" cy="329400"/>
           </a:xfrm>
           <a:prstGeom prst="rect">
             <a:avLst/>
@@ -1951,28 +1689,26 @@
                   <a:srgbClr val="ff8000"/>
                 </a:solidFill>
                 <a:latin typeface="Century Gothic"/>
+                <a:ea typeface="DejaVu Sans"/>
               </a:rPr>
-              <a:t>Persona : Yves Maunier MEDECIN JuNIOR</a:t>
+              <a:t>Persona : Yves Maunier MEDECIN JuNIOR (VisitEUr)</a:t>
             </a:r>
             <a:endParaRPr b="0" lang="fr-FR" sz="2400" spc="-1" strike="noStrike">
-              <a:solidFill>
-                <a:srgbClr val="ff8000"/>
-              </a:solidFill>
-              <a:latin typeface="Arial"/>
-            </a:endParaRPr>
-          </a:p>
-        </p:txBody>
-      </p:sp>
-      <p:sp>
-        <p:nvSpPr>
-          <p:cNvPr id="42" name="CustomShape 2"/>
+              <a:latin typeface="Arial"/>
+            </a:endParaRPr>
+          </a:p>
+        </p:txBody>
+      </p:sp>
+      <p:sp>
+        <p:nvSpPr>
+          <p:cNvPr id="39" name="CustomShape 2"/>
           <p:cNvSpPr/>
           <p:nvPr/>
         </p:nvSpPr>
         <p:spPr>
           <a:xfrm>
             <a:off x="2826720" y="1115280"/>
-            <a:ext cx="7999920" cy="1914840"/>
+            <a:ext cx="7999560" cy="1914840"/>
           </a:xfrm>
           <a:prstGeom prst="rect">
             <a:avLst/>
@@ -2004,6 +1740,7 @@
                   <a:srgbClr val="ffbf00"/>
                 </a:solidFill>
                 <a:latin typeface="Century Gothic"/>
+                <a:ea typeface="DejaVu Sans"/>
               </a:rPr>
               <a:t>Nom :</a:t>
             </a:r>
@@ -2013,6 +1750,7 @@
                   <a:srgbClr val="006474"/>
                 </a:solidFill>
                 <a:latin typeface="Century Gothic"/>
+                <a:ea typeface="DejaVu Sans"/>
               </a:rPr>
               <a:t> Maunier </a:t>
             </a:r>
@@ -2032,6 +1770,7 @@
                   <a:srgbClr val="ffbf00"/>
                 </a:solidFill>
                 <a:latin typeface="Century Gothic"/>
+                <a:ea typeface="DejaVu Sans"/>
               </a:rPr>
               <a:t>Prénom : </a:t>
             </a:r>
@@ -2041,6 +1780,7 @@
                   <a:srgbClr val="006474"/>
                 </a:solidFill>
                 <a:latin typeface="Century Gothic"/>
+                <a:ea typeface="DejaVu Sans"/>
               </a:rPr>
               <a:t> Yves</a:t>
             </a:r>
@@ -2060,6 +1800,7 @@
                   <a:srgbClr val="ffbf00"/>
                 </a:solidFill>
                 <a:latin typeface="Century Gothic"/>
+                <a:ea typeface="DejaVu Sans"/>
               </a:rPr>
               <a:t>Âge :</a:t>
             </a:r>
@@ -2069,6 +1810,7 @@
                   <a:srgbClr val="006474"/>
                 </a:solidFill>
                 <a:latin typeface="Century Gothic"/>
+                <a:ea typeface="DejaVu Sans"/>
               </a:rPr>
               <a:t> 27 ans</a:t>
             </a:r>
@@ -2088,6 +1830,7 @@
                   <a:srgbClr val="ffbf00"/>
                 </a:solidFill>
                 <a:latin typeface="Century Gothic"/>
+                <a:ea typeface="DejaVu Sans"/>
               </a:rPr>
               <a:t>Situation sociale :</a:t>
             </a:r>
@@ -2097,8 +1840,9 @@
                   <a:srgbClr val="006474"/>
                 </a:solidFill>
                 <a:latin typeface="Century Gothic"/>
+                <a:ea typeface="DejaVu Sans"/>
               </a:rPr>
-              <a:t> Jeune faisant parti d’un cabinet médicale</a:t>
+              <a:t> Jeune docteur faisant parti d’un cabinet médicale</a:t>
             </a:r>
             <a:endParaRPr b="0" lang="fr-FR" sz="1600" spc="-1" strike="noStrike">
               <a:latin typeface="Arial"/>
@@ -2116,6 +1860,7 @@
                   <a:srgbClr val="ffbf00"/>
                 </a:solidFill>
                 <a:latin typeface="Century Gothic"/>
+                <a:ea typeface="DejaVu Sans"/>
               </a:rPr>
               <a:t>Adresse :</a:t>
             </a:r>
@@ -2125,6 +1870,7 @@
                   <a:srgbClr val="006474"/>
                 </a:solidFill>
                 <a:latin typeface="Century Gothic"/>
+                <a:ea typeface="DejaVu Sans"/>
               </a:rPr>
               <a:t> 10 Rue pontel 76000</a:t>
             </a:r>
@@ -2136,13 +1882,13 @@
       </p:sp>
       <p:graphicFrame>
         <p:nvGraphicFramePr>
-          <p:cNvPr id="43" name="Table 3"/>
+          <p:cNvPr id="40" name="Table 3"/>
           <p:cNvGraphicFramePr/>
           <p:nvPr/>
         </p:nvGraphicFramePr>
         <p:xfrm>
-          <a:off x="473760" y="3396600"/>
-          <a:ext cx="11262600" cy="3360240"/>
+          <a:off x="473760" y="3288600"/>
+          <a:ext cx="11262240" cy="3359880"/>
         </p:xfrm>
         <a:graphic>
           <a:graphicData uri="http://schemas.openxmlformats.org/drawingml/2006/table">
@@ -2238,7 +1984,7 @@
                           </a:solidFill>
                           <a:latin typeface="Century Gothic"/>
                         </a:rPr>
-                        <a:t> Il souhaite acquérir de l’expérience pour pour voir se lancer seul et acheter son propre cabinet et avoir un réseaux patient conséquent</a:t>
+                        <a:t> Il souhaite acquérir de l’expérience pour pour voir se lancer seul, acheter son propre cabinet et avoir un réseaux patient conséquent</a:t>
                       </a:r>
                       <a:endParaRPr b="0" lang="fr-FR" sz="1600" spc="-1" strike="noStrike">
                         <a:latin typeface="Arial"/>
@@ -2298,7 +2044,7 @@
                           </a:solidFill>
                           <a:latin typeface="Century Gothic"/>
                         </a:rPr>
-                        <a:t> Grâce à l’aide de l’État (Agence nationale du dpc) Yves a le droit à 14 crédits par an pour se former à des thématiques liés à son métier de Médecin. Yves préfère utiliser un smartphone ou une tablette pour se former.</a:t>
+                        <a:t> Grâce à l’aide de l’État (Agence nationale du dpc) Yves a le droit à 14 crédits par an pour se former à des thématiques liées à son métier de Médecin. Yves préfère utiliser un smartphone ou une tablette pour se former.</a:t>
                       </a:r>
                       <a:endParaRPr b="0" lang="fr-FR" sz="1600" spc="-1" strike="noStrike">
                         <a:latin typeface="Arial"/>
@@ -2368,7 +2114,7 @@
                           </a:solidFill>
                           <a:latin typeface="Century Gothic"/>
                         </a:rPr>
-                        <a:t> Les formations proposé par EronSanté correspondent à ce qu’il recherche mais peuvent être suivies seulement via un ordinateur sur site web. L’UX du site web n’est pas suffisamment développé pour être totalement « responsive » est correspond à un frein pour Yves dans son choix d’organisme de formation</a:t>
+                        <a:t> Les formations proposées par EronSanté correspondent à ce qu’il recherche mais peuvent être suivies seulement via un ordinateur sur site web. L’UX du site web n’est pas suffisamment développé pour être totalement « responsive » sur téléphone est correspond à un frein pour Yves dans son choix d’organisme de formation</a:t>
                       </a:r>
                       <a:endParaRPr b="0" lang="fr-FR" sz="1600" spc="-1" strike="noStrike">
                         <a:latin typeface="Arial"/>
@@ -2413,7 +2159,7 @@
       </p:graphicFrame>
       <p:pic>
         <p:nvPicPr>
-          <p:cNvPr id="44" name="" descr=""/>
+          <p:cNvPr id="41" name="" descr=""/>
           <p:cNvPicPr/>
           <p:nvPr/>
         </p:nvPicPr>
@@ -2424,7 +2170,573 @@
         <p:spPr>
           <a:xfrm>
             <a:off x="1170720" y="792000"/>
-            <a:ext cx="989280" cy="2376000"/>
+            <a:ext cx="988920" cy="2375640"/>
+          </a:xfrm>
+          <a:prstGeom prst="rect">
+            <a:avLst/>
+          </a:prstGeom>
+          <a:ln>
+            <a:noFill/>
+          </a:ln>
+        </p:spPr>
+      </p:pic>
+    </p:spTree>
+  </p:cSld>
+  <mc:AlternateContent>
+    <mc:Choice Requires="p14">
+      <p:transition spd="slow" p14:dur="2000"/>
+    </mc:Choice>
+    <mc:Fallback>
+      <p:transition spd="slow"/>
+    </mc:Fallback>
+  </mc:AlternateContent>
+</p:sld>
+</file>
+
+<file path=ppt/slides/slide2.xml><?xml version="1.0" encoding="utf-8"?>
+<p:sld xmlns:a="http://schemas.openxmlformats.org/drawingml/2006/main" xmlns:p="http://schemas.openxmlformats.org/presentationml/2006/main" xmlns:r="http://schemas.openxmlformats.org/officeDocument/2006/relationships" xmlns:p14="http://schemas.microsoft.com/office/powerpoint/2010/main" xmlns:p15="http://schemas.microsoft.com/office/powerpoint/2012/main" xmlns:mc="http://schemas.openxmlformats.org/markup-compatibility/2006">
+  <p:cSld>
+    <p:spTree>
+      <p:nvGrpSpPr>
+        <p:cNvPr id="1" name=""/>
+        <p:cNvGrpSpPr/>
+        <p:nvPr/>
+      </p:nvGrpSpPr>
+      <p:grpSpPr>
+        <a:xfrm>
+          <a:off x="0" y="0"/>
+          <a:ext cx="0" cy="0"/>
+          <a:chOff x="0" y="0"/>
+          <a:chExt cx="0" cy="0"/>
+        </a:xfrm>
+      </p:grpSpPr>
+      <p:sp>
+        <p:nvSpPr>
+          <p:cNvPr id="42" name="CustomShape 1"/>
+          <p:cNvSpPr/>
+          <p:nvPr/>
+        </p:nvSpPr>
+        <p:spPr>
+          <a:xfrm>
+            <a:off x="864000" y="312480"/>
+            <a:ext cx="9794880" cy="329400"/>
+          </a:xfrm>
+          <a:prstGeom prst="rect">
+            <a:avLst/>
+          </a:prstGeom>
+          <a:noFill/>
+          <a:ln>
+            <a:noFill/>
+          </a:ln>
+        </p:spPr>
+        <p:style>
+          <a:lnRef idx="0"/>
+          <a:fillRef idx="0"/>
+          <a:effectRef idx="0"/>
+          <a:fontRef idx="minor"/>
+        </p:style>
+        <p:txBody>
+          <a:bodyPr lIns="0" rIns="0" tIns="0" bIns="0">
+            <a:spAutoFit/>
+          </a:bodyPr>
+          <a:p>
+            <a:pPr>
+              <a:lnSpc>
+                <a:spcPct val="90000"/>
+              </a:lnSpc>
+              <a:tabLst>
+                <a:tab algn="l" pos="0"/>
+              </a:tabLst>
+            </a:pPr>
+            <a:r>
+              <a:rPr b="1" lang="en-US" sz="2400" spc="-1" strike="noStrike" cap="all">
+                <a:solidFill>
+                  <a:srgbClr val="ff8000"/>
+                </a:solidFill>
+                <a:latin typeface="Century Gothic"/>
+                <a:ea typeface="DejaVu Sans"/>
+              </a:rPr>
+              <a:t>Persona : Elise AUDART Dentiste (APPRENANTE)</a:t>
+            </a:r>
+            <a:endParaRPr b="0" lang="fr-FR" sz="2400" spc="-1" strike="noStrike">
+              <a:latin typeface="Arial"/>
+            </a:endParaRPr>
+          </a:p>
+        </p:txBody>
+      </p:sp>
+      <p:sp>
+        <p:nvSpPr>
+          <p:cNvPr id="43" name="CustomShape 2"/>
+          <p:cNvSpPr/>
+          <p:nvPr/>
+        </p:nvSpPr>
+        <p:spPr>
+          <a:xfrm>
+            <a:off x="2826720" y="1115280"/>
+            <a:ext cx="7999560" cy="1914840"/>
+          </a:xfrm>
+          <a:prstGeom prst="rect">
+            <a:avLst/>
+          </a:prstGeom>
+          <a:noFill/>
+          <a:ln>
+            <a:noFill/>
+          </a:ln>
+        </p:spPr>
+        <p:style>
+          <a:lnRef idx="0"/>
+          <a:fillRef idx="0"/>
+          <a:effectRef idx="0"/>
+          <a:fontRef idx="minor"/>
+        </p:style>
+        <p:txBody>
+          <a:bodyPr lIns="90000" rIns="90000" tIns="45000" bIns="45000">
+            <a:spAutoFit/>
+          </a:bodyPr>
+          <a:p>
+            <a:pPr>
+              <a:lnSpc>
+                <a:spcPct val="150000"/>
+              </a:lnSpc>
+            </a:pPr>
+            <a:r>
+              <a:rPr b="1" lang="fr-FR" sz="1600" spc="-1" strike="noStrike">
+                <a:solidFill>
+                  <a:srgbClr val="ffbf00"/>
+                </a:solidFill>
+                <a:latin typeface="Century Gothic"/>
+                <a:ea typeface="DejaVu Sans"/>
+              </a:rPr>
+              <a:t>Nom :</a:t>
+            </a:r>
+            <a:r>
+              <a:rPr b="1" lang="fr-FR" sz="1600" spc="-1" strike="noStrike">
+                <a:solidFill>
+                  <a:srgbClr val="006474"/>
+                </a:solidFill>
+                <a:latin typeface="Century Gothic"/>
+                <a:ea typeface="DejaVu Sans"/>
+              </a:rPr>
+              <a:t> Audart </a:t>
+            </a:r>
+            <a:endParaRPr b="0" lang="fr-FR" sz="1600" spc="-1" strike="noStrike">
+              <a:latin typeface="Arial"/>
+            </a:endParaRPr>
+          </a:p>
+          <a:p>
+            <a:pPr>
+              <a:lnSpc>
+                <a:spcPct val="150000"/>
+              </a:lnSpc>
+            </a:pPr>
+            <a:r>
+              <a:rPr b="1" lang="fr-FR" sz="1600" spc="-1" strike="noStrike">
+                <a:solidFill>
+                  <a:srgbClr val="ffbf00"/>
+                </a:solidFill>
+                <a:latin typeface="Century Gothic"/>
+                <a:ea typeface="DejaVu Sans"/>
+              </a:rPr>
+              <a:t>Prénom : </a:t>
+            </a:r>
+            <a:r>
+              <a:rPr b="1" lang="fr-FR" sz="1600" spc="-1" strike="noStrike">
+                <a:solidFill>
+                  <a:srgbClr val="006474"/>
+                </a:solidFill>
+                <a:latin typeface="Century Gothic"/>
+                <a:ea typeface="DejaVu Sans"/>
+              </a:rPr>
+              <a:t> Elise</a:t>
+            </a:r>
+            <a:endParaRPr b="0" lang="fr-FR" sz="1600" spc="-1" strike="noStrike">
+              <a:latin typeface="Arial"/>
+            </a:endParaRPr>
+          </a:p>
+          <a:p>
+            <a:pPr>
+              <a:lnSpc>
+                <a:spcPct val="150000"/>
+              </a:lnSpc>
+            </a:pPr>
+            <a:r>
+              <a:rPr b="1" lang="fr-FR" sz="1600" spc="-1" strike="noStrike">
+                <a:solidFill>
+                  <a:srgbClr val="ffbf00"/>
+                </a:solidFill>
+                <a:latin typeface="Century Gothic"/>
+                <a:ea typeface="DejaVu Sans"/>
+              </a:rPr>
+              <a:t>Âge :</a:t>
+            </a:r>
+            <a:r>
+              <a:rPr b="1" lang="fr-FR" sz="1600" spc="-1" strike="noStrike">
+                <a:solidFill>
+                  <a:srgbClr val="006474"/>
+                </a:solidFill>
+                <a:latin typeface="Century Gothic"/>
+                <a:ea typeface="DejaVu Sans"/>
+              </a:rPr>
+              <a:t> 40 ans</a:t>
+            </a:r>
+            <a:endParaRPr b="0" lang="fr-FR" sz="1600" spc="-1" strike="noStrike">
+              <a:latin typeface="Arial"/>
+            </a:endParaRPr>
+          </a:p>
+          <a:p>
+            <a:pPr>
+              <a:lnSpc>
+                <a:spcPct val="150000"/>
+              </a:lnSpc>
+            </a:pPr>
+            <a:r>
+              <a:rPr b="1" lang="fr-FR" sz="1600" spc="-1" strike="noStrike">
+                <a:solidFill>
+                  <a:srgbClr val="ffbf00"/>
+                </a:solidFill>
+                <a:latin typeface="Century Gothic"/>
+                <a:ea typeface="DejaVu Sans"/>
+              </a:rPr>
+              <a:t>Situation sociale :</a:t>
+            </a:r>
+            <a:r>
+              <a:rPr b="1" lang="fr-FR" sz="1600" spc="-1" strike="noStrike">
+                <a:solidFill>
+                  <a:srgbClr val="006474"/>
+                </a:solidFill>
+                <a:latin typeface="Century Gothic"/>
+                <a:ea typeface="DejaVu Sans"/>
+              </a:rPr>
+              <a:t> Dentiste à son compte</a:t>
+            </a:r>
+            <a:endParaRPr b="0" lang="fr-FR" sz="1600" spc="-1" strike="noStrike">
+              <a:latin typeface="Arial"/>
+            </a:endParaRPr>
+          </a:p>
+          <a:p>
+            <a:pPr>
+              <a:lnSpc>
+                <a:spcPct val="150000"/>
+              </a:lnSpc>
+            </a:pPr>
+            <a:r>
+              <a:rPr b="1" lang="fr-FR" sz="1600" spc="-1" strike="noStrike">
+                <a:solidFill>
+                  <a:srgbClr val="ffbf00"/>
+                </a:solidFill>
+                <a:latin typeface="Century Gothic"/>
+                <a:ea typeface="DejaVu Sans"/>
+              </a:rPr>
+              <a:t>Adresse :</a:t>
+            </a:r>
+            <a:r>
+              <a:rPr b="1" lang="fr-FR" sz="1600" spc="-1" strike="noStrike">
+                <a:solidFill>
+                  <a:srgbClr val="006474"/>
+                </a:solidFill>
+                <a:latin typeface="Century Gothic"/>
+                <a:ea typeface="DejaVu Sans"/>
+              </a:rPr>
+              <a:t> 11 Bd Lazaret 11000</a:t>
+            </a:r>
+            <a:endParaRPr b="0" lang="fr-FR" sz="1600" spc="-1" strike="noStrike">
+              <a:latin typeface="Arial"/>
+            </a:endParaRPr>
+          </a:p>
+        </p:txBody>
+      </p:sp>
+      <p:graphicFrame>
+        <p:nvGraphicFramePr>
+          <p:cNvPr id="44" name="Table 3"/>
+          <p:cNvGraphicFramePr/>
+          <p:nvPr/>
+        </p:nvGraphicFramePr>
+        <p:xfrm>
+          <a:off x="473760" y="3288600"/>
+          <a:ext cx="11262240" cy="3360960"/>
+        </p:xfrm>
+        <a:graphic>
+          <a:graphicData uri="http://schemas.openxmlformats.org/drawingml/2006/table">
+            <a:tbl>
+              <a:tblPr/>
+              <a:tblGrid>
+                <a:gridCol w="5631120"/>
+                <a:gridCol w="5631480"/>
+              </a:tblGrid>
+              <a:tr h="831600">
+                <a:tc>
+                  <a:txBody>
+                    <a:bodyPr>
+                      <a:noAutofit/>
+                    </a:bodyPr>
+                    <a:p>
+                      <a:pPr>
+                        <a:lnSpc>
+                          <a:spcPct val="100000"/>
+                        </a:lnSpc>
+                      </a:pPr>
+                      <a:r>
+                        <a:rPr b="1" lang="fr-FR" sz="1600" spc="-1" strike="noStrike">
+                          <a:solidFill>
+                            <a:srgbClr val="ff8000"/>
+                          </a:solidFill>
+                          <a:latin typeface="Century Gothic"/>
+                        </a:rPr>
+                        <a:t>Personnalité :</a:t>
+                      </a:r>
+                      <a:r>
+                        <a:rPr b="1" lang="fr-FR" sz="1600" spc="-1" strike="noStrike">
+                          <a:solidFill>
+                            <a:srgbClr val="006474"/>
+                          </a:solidFill>
+                          <a:latin typeface="Century Gothic"/>
+                        </a:rPr>
+                        <a:t> Enérgique et Curieuse </a:t>
+                      </a:r>
+                      <a:endParaRPr b="0" lang="fr-FR" sz="1600" spc="-1" strike="noStrike">
+                        <a:latin typeface="Arial"/>
+                      </a:endParaRPr>
+                    </a:p>
+                  </a:txBody>
+                  <a:tcPr marL="91440" marR="91440">
+                    <a:lnL w="38160">
+                      <a:solidFill>
+                        <a:srgbClr val="ffffff"/>
+                      </a:solidFill>
+                    </a:lnL>
+                    <a:lnR w="38160">
+                      <a:solidFill>
+                        <a:srgbClr val="00859b"/>
+                      </a:solidFill>
+                    </a:lnR>
+                    <a:lnT w="38160">
+                      <a:solidFill>
+                        <a:srgbClr val="ffffff"/>
+                      </a:solidFill>
+                    </a:lnT>
+                    <a:lnB w="38160">
+                      <a:solidFill>
+                        <a:srgbClr val="00859b"/>
+                      </a:solidFill>
+                    </a:lnB>
+                    <a:noFill/>
+                  </a:tcPr>
+                </a:tc>
+                <a:tc>
+                  <a:txBody>
+                    <a:bodyPr>
+                      <a:noAutofit/>
+                    </a:bodyPr>
+                    <a:p>
+                      <a:pPr>
+                        <a:lnSpc>
+                          <a:spcPct val="100000"/>
+                        </a:lnSpc>
+                      </a:pPr>
+                      <a:r>
+                        <a:rPr b="1" lang="fr-FR" sz="1600" spc="-1" strike="noStrike">
+                          <a:solidFill>
+                            <a:srgbClr val="ff8000"/>
+                          </a:solidFill>
+                          <a:latin typeface="Century Gothic"/>
+                        </a:rPr>
+                        <a:t>Profil :</a:t>
+                      </a:r>
+                      <a:r>
+                        <a:rPr b="1" lang="fr-FR" sz="1600" spc="-1" strike="noStrike">
+                          <a:solidFill>
+                            <a:srgbClr val="006474"/>
+                          </a:solidFill>
+                          <a:latin typeface="Century Gothic"/>
+                        </a:rPr>
+                        <a:t> Elise est très active et est très rarement chez elle . Elle est passioné par son métier et est attentive aux webinar et formations liés à son métier</a:t>
+                      </a:r>
+                      <a:endParaRPr b="0" lang="fr-FR" sz="1600" spc="-1" strike="noStrike">
+                        <a:latin typeface="Arial"/>
+                      </a:endParaRPr>
+                    </a:p>
+                  </a:txBody>
+                  <a:tcPr marL="91440" marR="91440">
+                    <a:lnL w="38160">
+                      <a:solidFill>
+                        <a:srgbClr val="00859b"/>
+                      </a:solidFill>
+                    </a:lnL>
+                    <a:lnR w="38160">
+                      <a:solidFill>
+                        <a:srgbClr val="ffffff"/>
+                      </a:solidFill>
+                    </a:lnR>
+                    <a:lnT w="38160">
+                      <a:solidFill>
+                        <a:srgbClr val="ffffff"/>
+                      </a:solidFill>
+                    </a:lnT>
+                    <a:lnB w="38160">
+                      <a:solidFill>
+                        <a:srgbClr val="00859b"/>
+                      </a:solidFill>
+                    </a:lnB>
+                    <a:noFill/>
+                  </a:tcPr>
+                </a:tc>
+              </a:tr>
+              <a:tr h="1264320">
+                <a:tc gridSpan="2">
+                  <a:txBody>
+                    <a:bodyPr>
+                      <a:noAutofit/>
+                    </a:bodyPr>
+                    <a:p>
+                      <a:pPr>
+                        <a:lnSpc>
+                          <a:spcPct val="100000"/>
+                        </a:lnSpc>
+                      </a:pPr>
+                      <a:r>
+                        <a:rPr b="1" lang="fr-FR" sz="1600" spc="-1" strike="noStrike">
+                          <a:solidFill>
+                            <a:srgbClr val="ff8000"/>
+                          </a:solidFill>
+                          <a:latin typeface="Century Gothic"/>
+                        </a:rPr>
+                        <a:t>Utilisation du produit :</a:t>
+                      </a:r>
+                      <a:r>
+                        <a:rPr b="1" lang="fr-FR" sz="1600" spc="-1" strike="noStrike">
+                          <a:solidFill>
+                            <a:srgbClr val="006474"/>
+                          </a:solidFill>
+                          <a:latin typeface="Century Gothic"/>
+                        </a:rPr>
+                        <a:t> Elle a l’habitude de s’informer et de se former via sa tablette ou son smartphone. Elle souhaite pouvoir continuer à se former à distance en téléchargeant une application d’Elearning pour le personnel du milieu médical.</a:t>
+                      </a:r>
+                      <a:endParaRPr b="0" lang="fr-FR" sz="1600" spc="-1" strike="noStrike">
+                        <a:latin typeface="Arial"/>
+                      </a:endParaRPr>
+                    </a:p>
+                  </a:txBody>
+                  <a:tcPr marL="91440" marR="91440">
+                    <a:lnL w="38160">
+                      <a:solidFill>
+                        <a:srgbClr val="ffffff"/>
+                      </a:solidFill>
+                    </a:lnL>
+                    <a:lnR w="38160">
+                      <a:solidFill>
+                        <a:srgbClr val="ffffff"/>
+                      </a:solidFill>
+                    </a:lnR>
+                    <a:lnT w="38160">
+                      <a:solidFill>
+                        <a:srgbClr val="00859b"/>
+                      </a:solidFill>
+                    </a:lnT>
+                    <a:lnB w="38160">
+                      <a:solidFill>
+                        <a:srgbClr val="00859b"/>
+                      </a:solidFill>
+                    </a:lnB>
+                    <a:noFill/>
+                  </a:tcPr>
+                </a:tc>
+                <a:tc hMerge="1">
+                  <a:tcPr marL="90000" marR="90000">
+                    <a:solidFill>
+                      <a:srgbClr val="729fcf"/>
+                    </a:solidFill>
+                  </a:tcPr>
+                </a:tc>
+              </a:tr>
+              <a:tr h="1264320">
+                <a:tc gridSpan="2">
+                  <a:txBody>
+                    <a:bodyPr>
+                      <a:noAutofit/>
+                    </a:bodyPr>
+                    <a:p>
+                      <a:pPr>
+                        <a:lnSpc>
+                          <a:spcPct val="100000"/>
+                        </a:lnSpc>
+                        <a:tabLst>
+                          <a:tab algn="l" pos="0"/>
+                        </a:tabLst>
+                      </a:pPr>
+                      <a:r>
+                        <a:rPr b="1" lang="fr-FR" sz="1600" spc="-1" strike="noStrike">
+                          <a:solidFill>
+                            <a:srgbClr val="ff8000"/>
+                          </a:solidFill>
+                          <a:latin typeface="Century Gothic"/>
+                        </a:rPr>
+                        <a:t>Objectifs / problèmes résolus par le produit :</a:t>
+                      </a:r>
+                      <a:r>
+                        <a:rPr b="1" lang="fr-FR" sz="1600" spc="-1" strike="noStrike">
+                          <a:solidFill>
+                            <a:srgbClr val="006474"/>
+                          </a:solidFill>
+                          <a:latin typeface="Century Gothic"/>
+                        </a:rPr>
+                        <a:t> Une application comme celle envisagée par EronSanté lui permettrait de pouvoir suivre les dernières actualités , de se former sur des thématiques liées à son métier sans devoir effectué ses formations en présentiel ou sur un ordinateur, appareil qu’elle ne possède pas.</a:t>
+                      </a:r>
+                      <a:endParaRPr b="0" lang="fr-FR" sz="1600" spc="-1" strike="noStrike">
+                        <a:latin typeface="Arial"/>
+                      </a:endParaRPr>
+                    </a:p>
+                  </a:txBody>
+                  <a:tcPr marL="91440" marR="91440">
+                    <a:lnL w="38160">
+                      <a:solidFill>
+                        <a:srgbClr val="ffffff"/>
+                      </a:solidFill>
+                    </a:lnL>
+                    <a:lnR w="38160">
+                      <a:solidFill>
+                        <a:srgbClr val="ffffff"/>
+                      </a:solidFill>
+                    </a:lnR>
+                    <a:lnT w="38160">
+                      <a:solidFill>
+                        <a:srgbClr val="00859b"/>
+                      </a:solidFill>
+                    </a:lnT>
+                    <a:lnB w="38160">
+                      <a:solidFill>
+                        <a:srgbClr val="ffffff"/>
+                      </a:solidFill>
+                    </a:lnB>
+                    <a:noFill/>
+                  </a:tcPr>
+                </a:tc>
+                <a:tc hMerge="1">
+                  <a:tcPr marL="90000" marR="90000">
+                    <a:solidFill>
+                      <a:srgbClr val="729fcf"/>
+                    </a:solidFill>
+                  </a:tcPr>
+                </a:tc>
+              </a:tr>
+            </a:tbl>
+          </a:graphicData>
+        </a:graphic>
+      </p:graphicFrame>
+      <p:pic>
+        <p:nvPicPr>
+          <p:cNvPr id="45" name="" descr=""/>
+          <p:cNvPicPr/>
+          <p:nvPr/>
+        </p:nvPicPr>
+        <p:blipFill>
+          <a:blip r:embed="rId1"/>
+          <a:srcRect l="11619" t="0" r="57417" b="0"/>
+          <a:stretch/>
+        </p:blipFill>
+        <p:spPr>
+          <a:xfrm>
+            <a:off x="1080000" y="864000"/>
+            <a:ext cx="979200" cy="2304000"/>
           </a:xfrm>
           <a:prstGeom prst="rect">
             <a:avLst/>

</xml_diff>